<commit_message>
Update Final presentation Team 5.pptx
</commit_message>
<xml_diff>
--- a/final presentation/Final presentation Team 5.pptx
+++ b/final presentation/Final presentation Team 5.pptx
@@ -4068,25 +4068,48 @@
           </a:xfrm>
         </p:spPr>
         <p:txBody>
-          <a:bodyPr/>
+          <a:bodyPr>
+            <a:normAutofit lnSpcReduction="10000"/>
+          </a:bodyPr>
           <a:lstStyle/>
           <a:p>
             <a:r>
               <a:rPr lang="en-US" dirty="0" smtClean="0"/>
-              <a:t>A program that gets a job description and grades it based on how gender-biased it is.</a:t>
-            </a:r>
+              <a:t>A program that gets a job description and grades it based on how gender-biased it is</a:t>
+            </a:r>
+            <a:r>
+              <a:rPr lang="en-US" dirty="0" smtClean="0"/>
+              <a:t>.</a:t>
+            </a:r>
+          </a:p>
+          <a:p>
+            <a:pPr marL="0" indent="0">
+              <a:buNone/>
+            </a:pPr>
+            <a:endParaRPr lang="en-US" dirty="0" smtClean="0"/>
           </a:p>
           <a:p>
             <a:r>
               <a:rPr lang="en-US" dirty="0" smtClean="0"/>
               <a:t>A bank of phrases and words that can discourage women from applying to job descriptions. </a:t>
             </a:r>
+            <a:endParaRPr lang="en-US" dirty="0" smtClean="0"/>
+          </a:p>
+          <a:p>
+            <a:endParaRPr lang="en-US" dirty="0" smtClean="0"/>
           </a:p>
           <a:p>
             <a:r>
               <a:rPr lang="en-US" dirty="0" smtClean="0"/>
-              <a:t>Knowledge on the recruitment and HR domain.</a:t>
-            </a:r>
+              <a:t>Knowledge on the recruitment and HR domain</a:t>
+            </a:r>
+            <a:r>
+              <a:rPr lang="en-US" dirty="0" smtClean="0"/>
+              <a:t>.</a:t>
+            </a:r>
+          </a:p>
+          <a:p>
+            <a:endParaRPr lang="en-US" dirty="0" smtClean="0"/>
           </a:p>
           <a:p>
             <a:r>
@@ -4169,7 +4192,7 @@
         </p:blipFill>
         <p:spPr bwMode="auto">
           <a:xfrm>
-            <a:off x="268095" y="2513462"/>
+            <a:off x="268094" y="2906800"/>
             <a:ext cx="570105" cy="495041"/>
           </a:xfrm>
           <a:prstGeom prst="rect">
@@ -4210,7 +4233,7 @@
         </p:blipFill>
         <p:spPr bwMode="auto">
           <a:xfrm>
-            <a:off x="268095" y="3324497"/>
+            <a:off x="268094" y="4122913"/>
             <a:ext cx="570105" cy="495041"/>
           </a:xfrm>
           <a:prstGeom prst="rect">
@@ -4251,7 +4274,7 @@
         </p:blipFill>
         <p:spPr bwMode="auto">
           <a:xfrm>
-            <a:off x="268095" y="3975040"/>
+            <a:off x="268094" y="5182868"/>
             <a:ext cx="570105" cy="495041"/>
           </a:xfrm>
           <a:prstGeom prst="rect">
@@ -4918,7 +4941,7 @@
           <a:graphicData uri="http://schemas.openxmlformats.org/presentationml/2006/ole">
             <mc:AlternateContent xmlns:mc="http://schemas.openxmlformats.org/markup-compatibility/2006">
               <mc:Choice xmlns:v="urn:schemas-microsoft-com:vml" Requires="v">
-                <p:oleObj spid="_x0000_s1170" name="Worksheet" showAsIcon="1" r:id="rId3" imgW="914400" imgH="792360" progId="Excel.Sheet.12">
+                <p:oleObj spid="_x0000_s1180" name="Worksheet" showAsIcon="1" r:id="rId3" imgW="914400" imgH="792360" progId="Excel.Sheet.12">
                   <p:embed/>
                 </p:oleObj>
               </mc:Choice>
@@ -4975,7 +4998,7 @@
           <a:graphicData uri="http://schemas.openxmlformats.org/presentationml/2006/ole">
             <mc:AlternateContent xmlns:mc="http://schemas.openxmlformats.org/markup-compatibility/2006">
               <mc:Choice xmlns:v="urn:schemas-microsoft-com:vml" Requires="v">
-                <p:oleObj spid="_x0000_s1171" name="Worksheet" showAsIcon="1" r:id="rId5" imgW="914400" imgH="792360" progId="Excel.Sheet.12">
+                <p:oleObj spid="_x0000_s1181" name="Worksheet" showAsIcon="1" r:id="rId5" imgW="914400" imgH="792360" progId="Excel.Sheet.12">
                   <p:embed/>
                 </p:oleObj>
               </mc:Choice>
@@ -5378,11 +5401,7 @@
           <a:p>
             <a:r>
               <a:rPr lang="en-US" dirty="0" smtClean="0"/>
-              <a:t>We wante</a:t>
-            </a:r>
-            <a:r>
-              <a:rPr lang="en-US" dirty="0" smtClean="0"/>
-              <a:t>d to use a survey for labeled data – not enough</a:t>
+              <a:t>We wanted to use a survey for labeled data – not enough</a:t>
             </a:r>
           </a:p>
           <a:p>
@@ -5451,6 +5470,252 @@
           </a:p>
         </p:txBody>
       </p:sp>
+      <p:pic>
+        <p:nvPicPr>
+          <p:cNvPr id="2052" name="Picture 4" descr="Flexed biceps emoji clipart. Free download transparent .PNG | Creazilla"/>
+          <p:cNvPicPr>
+            <a:picLocks noChangeAspect="1" noChangeArrowheads="1"/>
+          </p:cNvPicPr>
+          <p:nvPr/>
+        </p:nvPicPr>
+        <p:blipFill>
+          <a:blip r:embed="rId2" cstate="print">
+            <a:extLst>
+              <a:ext uri="{28A0092B-C50C-407E-A947-70E740481C1C}">
+                <a14:useLocalDpi xmlns:a14="http://schemas.microsoft.com/office/drawing/2010/main" val="0"/>
+              </a:ext>
+            </a:extLst>
+          </a:blip>
+          <a:srcRect/>
+          <a:stretch>
+            <a:fillRect/>
+          </a:stretch>
+        </p:blipFill>
+        <p:spPr bwMode="auto">
+          <a:xfrm>
+            <a:off x="257934" y="1437517"/>
+            <a:ext cx="506341" cy="506341"/>
+          </a:xfrm>
+          <a:prstGeom prst="rect">
+            <a:avLst/>
+          </a:prstGeom>
+          <a:noFill/>
+          <a:extLst>
+            <a:ext uri="{909E8E84-426E-40DD-AFC4-6F175D3DCCD1}">
+              <a14:hiddenFill xmlns:a14="http://schemas.microsoft.com/office/drawing/2010/main">
+                <a:solidFill>
+                  <a:srgbClr val="FFFFFF"/>
+                </a:solidFill>
+              </a14:hiddenFill>
+            </a:ext>
+          </a:extLst>
+        </p:spPr>
+      </p:pic>
+      <p:pic>
+        <p:nvPicPr>
+          <p:cNvPr id="6" name="Picture 4" descr="Flexed biceps emoji clipart. Free download transparent .PNG | Creazilla"/>
+          <p:cNvPicPr>
+            <a:picLocks noChangeAspect="1" noChangeArrowheads="1"/>
+          </p:cNvPicPr>
+          <p:nvPr/>
+        </p:nvPicPr>
+        <p:blipFill>
+          <a:blip r:embed="rId2" cstate="print">
+            <a:extLst>
+              <a:ext uri="{28A0092B-C50C-407E-A947-70E740481C1C}">
+                <a14:useLocalDpi xmlns:a14="http://schemas.microsoft.com/office/drawing/2010/main" val="0"/>
+              </a:ext>
+            </a:extLst>
+          </a:blip>
+          <a:srcRect/>
+          <a:stretch>
+            <a:fillRect/>
+          </a:stretch>
+        </p:blipFill>
+        <p:spPr bwMode="auto">
+          <a:xfrm>
+            <a:off x="294896" y="1992526"/>
+            <a:ext cx="506341" cy="506341"/>
+          </a:xfrm>
+          <a:prstGeom prst="rect">
+            <a:avLst/>
+          </a:prstGeom>
+          <a:noFill/>
+          <a:extLst>
+            <a:ext uri="{909E8E84-426E-40DD-AFC4-6F175D3DCCD1}">
+              <a14:hiddenFill xmlns:a14="http://schemas.microsoft.com/office/drawing/2010/main">
+                <a:solidFill>
+                  <a:srgbClr val="FFFFFF"/>
+                </a:solidFill>
+              </a14:hiddenFill>
+            </a:ext>
+          </a:extLst>
+        </p:spPr>
+      </p:pic>
+      <p:pic>
+        <p:nvPicPr>
+          <p:cNvPr id="7" name="Picture 4" descr="Flexed biceps emoji clipart. Free download transparent .PNG | Creazilla"/>
+          <p:cNvPicPr>
+            <a:picLocks noChangeAspect="1" noChangeArrowheads="1"/>
+          </p:cNvPicPr>
+          <p:nvPr/>
+        </p:nvPicPr>
+        <p:blipFill>
+          <a:blip r:embed="rId2" cstate="print">
+            <a:extLst>
+              <a:ext uri="{28A0092B-C50C-407E-A947-70E740481C1C}">
+                <a14:useLocalDpi xmlns:a14="http://schemas.microsoft.com/office/drawing/2010/main" val="0"/>
+              </a:ext>
+            </a:extLst>
+          </a:blip>
+          <a:srcRect/>
+          <a:stretch>
+            <a:fillRect/>
+          </a:stretch>
+        </p:blipFill>
+        <p:spPr bwMode="auto">
+          <a:xfrm>
+            <a:off x="313377" y="2991087"/>
+            <a:ext cx="506341" cy="506341"/>
+          </a:xfrm>
+          <a:prstGeom prst="rect">
+            <a:avLst/>
+          </a:prstGeom>
+          <a:noFill/>
+          <a:extLst>
+            <a:ext uri="{909E8E84-426E-40DD-AFC4-6F175D3DCCD1}">
+              <a14:hiddenFill xmlns:a14="http://schemas.microsoft.com/office/drawing/2010/main">
+                <a:solidFill>
+                  <a:srgbClr val="FFFFFF"/>
+                </a:solidFill>
+              </a14:hiddenFill>
+            </a:ext>
+          </a:extLst>
+        </p:spPr>
+      </p:pic>
+      <p:pic>
+        <p:nvPicPr>
+          <p:cNvPr id="8" name="Picture 4" descr="Flexed biceps emoji clipart. Free download transparent .PNG | Creazilla"/>
+          <p:cNvPicPr>
+            <a:picLocks noChangeAspect="1" noChangeArrowheads="1"/>
+          </p:cNvPicPr>
+          <p:nvPr/>
+        </p:nvPicPr>
+        <p:blipFill>
+          <a:blip r:embed="rId2" cstate="print">
+            <a:extLst>
+              <a:ext uri="{28A0092B-C50C-407E-A947-70E740481C1C}">
+                <a14:useLocalDpi xmlns:a14="http://schemas.microsoft.com/office/drawing/2010/main" val="0"/>
+              </a:ext>
+            </a:extLst>
+          </a:blip>
+          <a:srcRect/>
+          <a:stretch>
+            <a:fillRect/>
+          </a:stretch>
+        </p:blipFill>
+        <p:spPr bwMode="auto">
+          <a:xfrm>
+            <a:off x="313377" y="3832699"/>
+            <a:ext cx="506341" cy="506341"/>
+          </a:xfrm>
+          <a:prstGeom prst="rect">
+            <a:avLst/>
+          </a:prstGeom>
+          <a:noFill/>
+          <a:extLst>
+            <a:ext uri="{909E8E84-426E-40DD-AFC4-6F175D3DCCD1}">
+              <a14:hiddenFill xmlns:a14="http://schemas.microsoft.com/office/drawing/2010/main">
+                <a:solidFill>
+                  <a:srgbClr val="FFFFFF"/>
+                </a:solidFill>
+              </a14:hiddenFill>
+            </a:ext>
+          </a:extLst>
+        </p:spPr>
+      </p:pic>
+      <p:pic>
+        <p:nvPicPr>
+          <p:cNvPr id="9" name="Picture 4" descr="Flexed biceps emoji clipart. Free download transparent .PNG | Creazilla"/>
+          <p:cNvPicPr>
+            <a:picLocks noChangeAspect="1" noChangeArrowheads="1"/>
+          </p:cNvPicPr>
+          <p:nvPr/>
+        </p:nvPicPr>
+        <p:blipFill>
+          <a:blip r:embed="rId2" cstate="print">
+            <a:extLst>
+              <a:ext uri="{28A0092B-C50C-407E-A947-70E740481C1C}">
+                <a14:useLocalDpi xmlns:a14="http://schemas.microsoft.com/office/drawing/2010/main" val="0"/>
+              </a:ext>
+            </a:extLst>
+          </a:blip>
+          <a:srcRect/>
+          <a:stretch>
+            <a:fillRect/>
+          </a:stretch>
+        </p:blipFill>
+        <p:spPr bwMode="auto">
+          <a:xfrm>
+            <a:off x="331859" y="4488181"/>
+            <a:ext cx="506341" cy="506341"/>
+          </a:xfrm>
+          <a:prstGeom prst="rect">
+            <a:avLst/>
+          </a:prstGeom>
+          <a:noFill/>
+          <a:extLst>
+            <a:ext uri="{909E8E84-426E-40DD-AFC4-6F175D3DCCD1}">
+              <a14:hiddenFill xmlns:a14="http://schemas.microsoft.com/office/drawing/2010/main">
+                <a:solidFill>
+                  <a:srgbClr val="FFFFFF"/>
+                </a:solidFill>
+              </a14:hiddenFill>
+            </a:ext>
+          </a:extLst>
+        </p:spPr>
+      </p:pic>
+      <p:pic>
+        <p:nvPicPr>
+          <p:cNvPr id="10" name="Picture 4" descr="Flexed biceps emoji clipart. Free download transparent .PNG | Creazilla"/>
+          <p:cNvPicPr>
+            <a:picLocks noChangeAspect="1" noChangeArrowheads="1"/>
+          </p:cNvPicPr>
+          <p:nvPr/>
+        </p:nvPicPr>
+        <p:blipFill>
+          <a:blip r:embed="rId2" cstate="print">
+            <a:extLst>
+              <a:ext uri="{28A0092B-C50C-407E-A947-70E740481C1C}">
+                <a14:useLocalDpi xmlns:a14="http://schemas.microsoft.com/office/drawing/2010/main" val="0"/>
+              </a:ext>
+            </a:extLst>
+          </a:blip>
+          <a:srcRect/>
+          <a:stretch>
+            <a:fillRect/>
+          </a:stretch>
+        </p:blipFill>
+        <p:spPr bwMode="auto">
+          <a:xfrm>
+            <a:off x="332711" y="5211999"/>
+            <a:ext cx="506341" cy="506341"/>
+          </a:xfrm>
+          <a:prstGeom prst="rect">
+            <a:avLst/>
+          </a:prstGeom>
+          <a:noFill/>
+          <a:extLst>
+            <a:ext uri="{909E8E84-426E-40DD-AFC4-6F175D3DCCD1}">
+              <a14:hiddenFill xmlns:a14="http://schemas.microsoft.com/office/drawing/2010/main">
+                <a:solidFill>
+                  <a:srgbClr val="FFFFFF"/>
+                </a:solidFill>
+              </a14:hiddenFill>
+            </a:ext>
+          </a:extLst>
+        </p:spPr>
+      </p:pic>
     </p:spTree>
     <p:extLst>
       <p:ext uri="{BB962C8B-B14F-4D97-AF65-F5344CB8AC3E}">

</xml_diff>